<commit_message>
Presentacion y Excel pacientes Nico
</commit_message>
<xml_diff>
--- a/Tesis/Nicolas/(Tania) Seleccion de Metodología.pptx
+++ b/Tesis/Nicolas/(Tania) Seleccion de Metodología.pptx
@@ -153,7 +153,7 @@
 <file path=ppt/charts/chart1.xml><?xml version="1.0" encoding="utf-8"?>
 <c:chartSpace xmlns:c="http://schemas.openxmlformats.org/drawingml/2006/chart" xmlns:a="http://schemas.openxmlformats.org/drawingml/2006/main" xmlns:r="http://schemas.openxmlformats.org/officeDocument/2006/relationships">
   <c:date1904 val="0"/>
-  <c:lang val="en-US"/>
+  <c:lang val="es-ES"/>
   <c:roundedCorners val="0"/>
   <mc:AlternateContent xmlns:mc="http://schemas.openxmlformats.org/markup-compatibility/2006">
     <mc:Choice xmlns:c14="http://schemas.microsoft.com/office/drawing/2007/8/2/chart" Requires="c14">
@@ -582,11 +582,11 @@
         </c:dLbls>
         <c:gapWidth val="219"/>
         <c:overlap val="-27"/>
-        <c:axId val="26379376"/>
-        <c:axId val="26377744"/>
+        <c:axId val="459548192"/>
+        <c:axId val="459548736"/>
       </c:barChart>
       <c:catAx>
-        <c:axId val="26379376"/>
+        <c:axId val="459548192"/>
         <c:scaling>
           <c:orientation val="minMax"/>
         </c:scaling>
@@ -629,7 +629,7 @@
             <a:endParaRPr lang="es-CL"/>
           </a:p>
         </c:txPr>
-        <c:crossAx val="26377744"/>
+        <c:crossAx val="459548736"/>
         <c:crosses val="autoZero"/>
         <c:auto val="1"/>
         <c:lblAlgn val="ctr"/>
@@ -637,7 +637,7 @@
         <c:noMultiLvlLbl val="0"/>
       </c:catAx>
       <c:valAx>
-        <c:axId val="26377744"/>
+        <c:axId val="459548736"/>
         <c:scaling>
           <c:orientation val="minMax"/>
         </c:scaling>
@@ -688,7 +688,7 @@
             <a:endParaRPr lang="es-CL"/>
           </a:p>
         </c:txPr>
-        <c:crossAx val="26379376"/>
+        <c:crossAx val="459548192"/>
         <c:crosses val="autoZero"/>
         <c:crossBetween val="between"/>
       </c:valAx>
@@ -1395,7 +1395,7 @@
           <a:p>
             <a:fld id="{3744B026-0A0E-4142-A80F-344BFB91409F}" type="datetimeFigureOut">
               <a:rPr lang="es-CL" smtClean="0"/>
-              <a:t>22-05-2017</a:t>
+              <a:t>19-07-2017</a:t>
             </a:fld>
             <a:endParaRPr lang="es-CL"/>
           </a:p>
@@ -1554,7 +1554,7 @@
           <a:p>
             <a:fld id="{AA2741BF-58E7-4459-9C20-065BB7472DE7}" type="slidenum">
               <a:rPr lang="es-CL" smtClean="0"/>
-              <a:t>‹#›</a:t>
+              <a:t>‹Nº›</a:t>
             </a:fld>
             <a:endParaRPr lang="es-CL"/>
           </a:p>
@@ -2308,7 +2308,6 @@
               <a:rPr lang="es-CL" dirty="0" smtClean="0"/>
               <a:t>7 </a:t>
             </a:r>
-            <a:endParaRPr lang="es-CL" dirty="0" smtClean="0"/>
           </a:p>
         </p:txBody>
       </p:sp>
@@ -2607,11 +2606,7 @@
           <a:p>
             <a:r>
               <a:rPr lang="es-CL" dirty="0" smtClean="0"/>
-              <a:t>13 </a:t>
-            </a:r>
-            <a:r>
-              <a:rPr lang="es-CL" dirty="0" smtClean="0"/>
-              <a:t>pacientes</a:t>
+              <a:t>13 pacientes</a:t>
             </a:r>
           </a:p>
           <a:p>
@@ -5626,7 +5621,7 @@
           <a:p>
             <a:fld id="{8ACE2883-FDD3-4BF6-B200-D395FB16E657}" type="datetimeFigureOut">
               <a:rPr lang="es-CL" smtClean="0"/>
-              <a:t>22-05-2017</a:t>
+              <a:t>19-07-2017</a:t>
             </a:fld>
             <a:endParaRPr lang="es-CL"/>
           </a:p>
@@ -5668,7 +5663,7 @@
           <a:p>
             <a:fld id="{46AF34B9-F4D9-423C-A029-72F3C532A650}" type="slidenum">
               <a:rPr lang="es-CL" smtClean="0"/>
-              <a:t>‹#›</a:t>
+              <a:t>‹Nº›</a:t>
             </a:fld>
             <a:endParaRPr lang="es-CL"/>
           </a:p>
@@ -5796,7 +5791,7 @@
           <a:p>
             <a:fld id="{8ACE2883-FDD3-4BF6-B200-D395FB16E657}" type="datetimeFigureOut">
               <a:rPr lang="es-CL" smtClean="0"/>
-              <a:t>22-05-2017</a:t>
+              <a:t>19-07-2017</a:t>
             </a:fld>
             <a:endParaRPr lang="es-CL"/>
           </a:p>
@@ -5838,7 +5833,7 @@
           <a:p>
             <a:fld id="{46AF34B9-F4D9-423C-A029-72F3C532A650}" type="slidenum">
               <a:rPr lang="es-CL" smtClean="0"/>
-              <a:t>‹#›</a:t>
+              <a:t>‹Nº›</a:t>
             </a:fld>
             <a:endParaRPr lang="es-CL"/>
           </a:p>
@@ -5976,7 +5971,7 @@
           <a:p>
             <a:fld id="{8ACE2883-FDD3-4BF6-B200-D395FB16E657}" type="datetimeFigureOut">
               <a:rPr lang="es-CL" smtClean="0"/>
-              <a:t>22-05-2017</a:t>
+              <a:t>19-07-2017</a:t>
             </a:fld>
             <a:endParaRPr lang="es-CL"/>
           </a:p>
@@ -6018,7 +6013,7 @@
           <a:p>
             <a:fld id="{46AF34B9-F4D9-423C-A029-72F3C532A650}" type="slidenum">
               <a:rPr lang="es-CL" smtClean="0"/>
-              <a:t>‹#›</a:t>
+              <a:t>‹Nº›</a:t>
             </a:fld>
             <a:endParaRPr lang="es-CL"/>
           </a:p>
@@ -6146,7 +6141,7 @@
           <a:p>
             <a:fld id="{8ACE2883-FDD3-4BF6-B200-D395FB16E657}" type="datetimeFigureOut">
               <a:rPr lang="es-CL" smtClean="0"/>
-              <a:t>22-05-2017</a:t>
+              <a:t>19-07-2017</a:t>
             </a:fld>
             <a:endParaRPr lang="es-CL"/>
           </a:p>
@@ -6188,7 +6183,7 @@
           <a:p>
             <a:fld id="{46AF34B9-F4D9-423C-A029-72F3C532A650}" type="slidenum">
               <a:rPr lang="es-CL" smtClean="0"/>
-              <a:t>‹#›</a:t>
+              <a:t>‹Nº›</a:t>
             </a:fld>
             <a:endParaRPr lang="es-CL"/>
           </a:p>
@@ -6392,7 +6387,7 @@
           <a:p>
             <a:fld id="{8ACE2883-FDD3-4BF6-B200-D395FB16E657}" type="datetimeFigureOut">
               <a:rPr lang="es-CL" smtClean="0"/>
-              <a:t>22-05-2017</a:t>
+              <a:t>19-07-2017</a:t>
             </a:fld>
             <a:endParaRPr lang="es-CL"/>
           </a:p>
@@ -6434,7 +6429,7 @@
           <a:p>
             <a:fld id="{46AF34B9-F4D9-423C-A029-72F3C532A650}" type="slidenum">
               <a:rPr lang="es-CL" smtClean="0"/>
-              <a:t>‹#›</a:t>
+              <a:t>‹Nº›</a:t>
             </a:fld>
             <a:endParaRPr lang="es-CL"/>
           </a:p>
@@ -6624,7 +6619,7 @@
           <a:p>
             <a:fld id="{8ACE2883-FDD3-4BF6-B200-D395FB16E657}" type="datetimeFigureOut">
               <a:rPr lang="es-CL" smtClean="0"/>
-              <a:t>22-05-2017</a:t>
+              <a:t>19-07-2017</a:t>
             </a:fld>
             <a:endParaRPr lang="es-CL"/>
           </a:p>
@@ -6666,7 +6661,7 @@
           <a:p>
             <a:fld id="{46AF34B9-F4D9-423C-A029-72F3C532A650}" type="slidenum">
               <a:rPr lang="es-CL" smtClean="0"/>
-              <a:t>‹#›</a:t>
+              <a:t>‹Nº›</a:t>
             </a:fld>
             <a:endParaRPr lang="es-CL"/>
           </a:p>
@@ -6991,7 +6986,7 @@
           <a:p>
             <a:fld id="{8ACE2883-FDD3-4BF6-B200-D395FB16E657}" type="datetimeFigureOut">
               <a:rPr lang="es-CL" smtClean="0"/>
-              <a:t>22-05-2017</a:t>
+              <a:t>19-07-2017</a:t>
             </a:fld>
             <a:endParaRPr lang="es-CL"/>
           </a:p>
@@ -7033,7 +7028,7 @@
           <a:p>
             <a:fld id="{46AF34B9-F4D9-423C-A029-72F3C532A650}" type="slidenum">
               <a:rPr lang="es-CL" smtClean="0"/>
-              <a:t>‹#›</a:t>
+              <a:t>‹Nº›</a:t>
             </a:fld>
             <a:endParaRPr lang="es-CL"/>
           </a:p>
@@ -7109,7 +7104,7 @@
           <a:p>
             <a:fld id="{8ACE2883-FDD3-4BF6-B200-D395FB16E657}" type="datetimeFigureOut">
               <a:rPr lang="es-CL" smtClean="0"/>
-              <a:t>22-05-2017</a:t>
+              <a:t>19-07-2017</a:t>
             </a:fld>
             <a:endParaRPr lang="es-CL"/>
           </a:p>
@@ -7151,7 +7146,7 @@
           <a:p>
             <a:fld id="{46AF34B9-F4D9-423C-A029-72F3C532A650}" type="slidenum">
               <a:rPr lang="es-CL" smtClean="0"/>
-              <a:t>‹#›</a:t>
+              <a:t>‹Nº›</a:t>
             </a:fld>
             <a:endParaRPr lang="es-CL"/>
           </a:p>
@@ -7204,7 +7199,7 @@
           <a:p>
             <a:fld id="{8ACE2883-FDD3-4BF6-B200-D395FB16E657}" type="datetimeFigureOut">
               <a:rPr lang="es-CL" smtClean="0"/>
-              <a:t>22-05-2017</a:t>
+              <a:t>19-07-2017</a:t>
             </a:fld>
             <a:endParaRPr lang="es-CL"/>
           </a:p>
@@ -7246,7 +7241,7 @@
           <a:p>
             <a:fld id="{46AF34B9-F4D9-423C-A029-72F3C532A650}" type="slidenum">
               <a:rPr lang="es-CL" smtClean="0"/>
-              <a:t>‹#›</a:t>
+              <a:t>‹Nº›</a:t>
             </a:fld>
             <a:endParaRPr lang="es-CL"/>
           </a:p>
@@ -7481,7 +7476,7 @@
           <a:p>
             <a:fld id="{8ACE2883-FDD3-4BF6-B200-D395FB16E657}" type="datetimeFigureOut">
               <a:rPr lang="es-CL" smtClean="0"/>
-              <a:t>22-05-2017</a:t>
+              <a:t>19-07-2017</a:t>
             </a:fld>
             <a:endParaRPr lang="es-CL"/>
           </a:p>
@@ -7523,7 +7518,7 @@
           <a:p>
             <a:fld id="{46AF34B9-F4D9-423C-A029-72F3C532A650}" type="slidenum">
               <a:rPr lang="es-CL" smtClean="0"/>
-              <a:t>‹#›</a:t>
+              <a:t>‹Nº›</a:t>
             </a:fld>
             <a:endParaRPr lang="es-CL"/>
           </a:p>
@@ -7734,7 +7729,7 @@
           <a:p>
             <a:fld id="{8ACE2883-FDD3-4BF6-B200-D395FB16E657}" type="datetimeFigureOut">
               <a:rPr lang="es-CL" smtClean="0"/>
-              <a:t>22-05-2017</a:t>
+              <a:t>19-07-2017</a:t>
             </a:fld>
             <a:endParaRPr lang="es-CL"/>
           </a:p>
@@ -7776,7 +7771,7 @@
           <a:p>
             <a:fld id="{46AF34B9-F4D9-423C-A029-72F3C532A650}" type="slidenum">
               <a:rPr lang="es-CL" smtClean="0"/>
-              <a:t>‹#›</a:t>
+              <a:t>‹Nº›</a:t>
             </a:fld>
             <a:endParaRPr lang="es-CL"/>
           </a:p>
@@ -7947,7 +7942,7 @@
           <a:p>
             <a:fld id="{8ACE2883-FDD3-4BF6-B200-D395FB16E657}" type="datetimeFigureOut">
               <a:rPr lang="es-CL" smtClean="0"/>
-              <a:t>22-05-2017</a:t>
+              <a:t>19-07-2017</a:t>
             </a:fld>
             <a:endParaRPr lang="es-CL"/>
           </a:p>
@@ -8025,7 +8020,7 @@
           <a:p>
             <a:fld id="{46AF34B9-F4D9-423C-A029-72F3C532A650}" type="slidenum">
               <a:rPr lang="es-CL" smtClean="0"/>
-              <a:t>‹#›</a:t>
+              <a:t>‹Nº›</a:t>
             </a:fld>
             <a:endParaRPr lang="es-CL"/>
           </a:p>
@@ -12902,11 +12897,7 @@
             </a:pPr>
             <a:r>
               <a:rPr lang="es-CL" sz="2400" dirty="0" smtClean="0"/>
-              <a:t>En general, ambos grupos son integrativos y equitativos entre las distintas disciplinas</a:t>
-            </a:r>
-            <a:r>
-              <a:rPr lang="es-CL" sz="2400" dirty="0" smtClean="0"/>
-              <a:t>.</a:t>
+              <a:t>En general, ambos grupos son integrativos y equitativos entre las distintas disciplinas.</a:t>
             </a:r>
           </a:p>
           <a:p>
@@ -17181,7 +17172,7 @@
         </p:blipFill>
         <p:spPr>
           <a:xfrm>
-            <a:off x="985908" y="4071938"/>
+            <a:off x="985908" y="4062413"/>
             <a:ext cx="4457700" cy="2105025"/>
           </a:xfrm>
           <a:prstGeom prst="rect">

</xml_diff>